<commit_message>
docs : 페이지 맵 ppt 수정, refactor : Controller 코드 수정
</commit_message>
<xml_diff>
--- a/document/ppt/Hi Snack! 페이지 맵.pptx
+++ b/document/ppt/Hi Snack! 페이지 맵.pptx
@@ -265,7 +265,7 @@
           <a:p>
             <a:fld id="{A7ED0D47-21D1-4F27-8067-E72377D9E3EB}" type="datetimeFigureOut">
               <a:rPr lang="ko-KR" altLang="en-US" smtClean="0"/>
-              <a:t>2022-03-22-(Tue)</a:t>
+              <a:t>2022-03-30 Wed</a:t>
             </a:fld>
             <a:endParaRPr lang="ko-KR" altLang="en-US"/>
           </a:p>
@@ -463,7 +463,7 @@
           <a:p>
             <a:fld id="{A7ED0D47-21D1-4F27-8067-E72377D9E3EB}" type="datetimeFigureOut">
               <a:rPr lang="ko-KR" altLang="en-US" smtClean="0"/>
-              <a:t>2022-03-22-(Tue)</a:t>
+              <a:t>2022-03-30 Wed</a:t>
             </a:fld>
             <a:endParaRPr lang="ko-KR" altLang="en-US"/>
           </a:p>
@@ -671,7 +671,7 @@
           <a:p>
             <a:fld id="{A7ED0D47-21D1-4F27-8067-E72377D9E3EB}" type="datetimeFigureOut">
               <a:rPr lang="ko-KR" altLang="en-US" smtClean="0"/>
-              <a:t>2022-03-22-(Tue)</a:t>
+              <a:t>2022-03-30 Wed</a:t>
             </a:fld>
             <a:endParaRPr lang="ko-KR" altLang="en-US"/>
           </a:p>
@@ -1222,7 +1222,7 @@
           <a:p>
             <a:fld id="{A7ED0D47-21D1-4F27-8067-E72377D9E3EB}" type="datetimeFigureOut">
               <a:rPr lang="ko-KR" altLang="en-US" smtClean="0"/>
-              <a:t>2022-03-22-(Tue)</a:t>
+              <a:t>2022-03-30 Wed</a:t>
             </a:fld>
             <a:endParaRPr lang="ko-KR" altLang="en-US"/>
           </a:p>
@@ -1487,7 +1487,7 @@
           <a:p>
             <a:fld id="{A7ED0D47-21D1-4F27-8067-E72377D9E3EB}" type="datetimeFigureOut">
               <a:rPr lang="ko-KR" altLang="en-US" smtClean="0"/>
-              <a:t>2022-03-22-(Tue)</a:t>
+              <a:t>2022-03-30 Wed</a:t>
             </a:fld>
             <a:endParaRPr lang="ko-KR" altLang="en-US"/>
           </a:p>
@@ -1899,7 +1899,7 @@
           <a:p>
             <a:fld id="{A7ED0D47-21D1-4F27-8067-E72377D9E3EB}" type="datetimeFigureOut">
               <a:rPr lang="ko-KR" altLang="en-US" smtClean="0"/>
-              <a:t>2022-03-22-(Tue)</a:t>
+              <a:t>2022-03-30 Wed</a:t>
             </a:fld>
             <a:endParaRPr lang="ko-KR" altLang="en-US"/>
           </a:p>
@@ -2040,7 +2040,7 @@
           <a:p>
             <a:fld id="{A7ED0D47-21D1-4F27-8067-E72377D9E3EB}" type="datetimeFigureOut">
               <a:rPr lang="ko-KR" altLang="en-US" smtClean="0"/>
-              <a:t>2022-03-22-(Tue)</a:t>
+              <a:t>2022-03-30 Wed</a:t>
             </a:fld>
             <a:endParaRPr lang="ko-KR" altLang="en-US"/>
           </a:p>
@@ -2153,7 +2153,7 @@
           <a:p>
             <a:fld id="{A7ED0D47-21D1-4F27-8067-E72377D9E3EB}" type="datetimeFigureOut">
               <a:rPr lang="ko-KR" altLang="en-US" smtClean="0"/>
-              <a:t>2022-03-22-(Tue)</a:t>
+              <a:t>2022-03-30 Wed</a:t>
             </a:fld>
             <a:endParaRPr lang="ko-KR" altLang="en-US"/>
           </a:p>
@@ -2464,7 +2464,7 @@
           <a:p>
             <a:fld id="{A7ED0D47-21D1-4F27-8067-E72377D9E3EB}" type="datetimeFigureOut">
               <a:rPr lang="ko-KR" altLang="en-US" smtClean="0"/>
-              <a:t>2022-03-22-(Tue)</a:t>
+              <a:t>2022-03-30 Wed</a:t>
             </a:fld>
             <a:endParaRPr lang="ko-KR" altLang="en-US"/>
           </a:p>
@@ -2752,7 +2752,7 @@
           <a:p>
             <a:fld id="{A7ED0D47-21D1-4F27-8067-E72377D9E3EB}" type="datetimeFigureOut">
               <a:rPr lang="ko-KR" altLang="en-US" smtClean="0"/>
-              <a:t>2022-03-22-(Tue)</a:t>
+              <a:t>2022-03-30 Wed</a:t>
             </a:fld>
             <a:endParaRPr lang="ko-KR" altLang="en-US"/>
           </a:p>
@@ -2993,7 +2993,7 @@
           <a:p>
             <a:fld id="{A7ED0D47-21D1-4F27-8067-E72377D9E3EB}" type="datetimeFigureOut">
               <a:rPr lang="ko-KR" altLang="en-US" smtClean="0"/>
-              <a:t>2022-03-22-(Tue)</a:t>
+              <a:t>2022-03-30 Wed</a:t>
             </a:fld>
             <a:endParaRPr lang="ko-KR" altLang="en-US"/>
           </a:p>
@@ -7170,7 +7170,7 @@
         </p:nvSpPr>
         <p:spPr>
           <a:xfrm>
-            <a:off x="2285595" y="3903613"/>
+            <a:off x="2285591" y="3296160"/>
             <a:ext cx="1375615" cy="413657"/>
           </a:xfrm>
           <a:prstGeom prst="rect">
@@ -7199,9 +7199,10 @@
           <a:p>
             <a:pPr algn="ctr"/>
             <a:r>
-              <a:rPr lang="ko-KR" altLang="en-US"/>
-              <a:t>읽기</a:t>
-            </a:r>
+              <a:rPr lang="ko-KR" altLang="en-US" dirty="0" smtClean="0"/>
+              <a:t>조회</a:t>
+            </a:r>
+            <a:endParaRPr lang="ko-KR" altLang="en-US" dirty="0"/>
           </a:p>
         </p:txBody>
       </p:sp>
@@ -7219,7 +7220,7 @@
         </p:nvSpPr>
         <p:spPr>
           <a:xfrm>
-            <a:off x="2285596" y="3303825"/>
+            <a:off x="2285592" y="3916646"/>
             <a:ext cx="1375615" cy="413657"/>
           </a:xfrm>
           <a:prstGeom prst="rect">
@@ -7248,9 +7249,10 @@
           <a:p>
             <a:pPr algn="ctr"/>
             <a:r>
-              <a:rPr lang="ko-KR" altLang="en-US"/>
-              <a:t>생성</a:t>
-            </a:r>
+              <a:rPr lang="ko-KR" altLang="en-US" dirty="0" smtClean="0"/>
+              <a:t>등록</a:t>
+            </a:r>
+            <a:endParaRPr lang="ko-KR" altLang="en-US" dirty="0"/>
           </a:p>
         </p:txBody>
       </p:sp>
@@ -7366,7 +7368,7 @@
         </p:nvSpPr>
         <p:spPr>
           <a:xfrm>
-            <a:off x="4021163" y="3903613"/>
+            <a:off x="4021163" y="3303825"/>
             <a:ext cx="1375615" cy="413657"/>
           </a:xfrm>
           <a:prstGeom prst="rect">
@@ -7395,18 +7397,19 @@
           <a:p>
             <a:pPr algn="ctr"/>
             <a:r>
-              <a:rPr lang="ko-KR" altLang="en-US"/>
-              <a:t>읽기</a:t>
-            </a:r>
-          </a:p>
-        </p:txBody>
-      </p:sp>
-      <p:sp>
-        <p:nvSpPr>
-          <p:cNvPr id="36" name="직사각형 35">
-            <a:extLst>
-              <a:ext uri="{FF2B5EF4-FFF2-40B4-BE49-F238E27FC236}">
-                <a16:creationId xmlns:a16="http://schemas.microsoft.com/office/drawing/2014/main" id="{6A86E2E0-C631-436D-A557-8758931A0DAA}"/>
+              <a:rPr lang="ko-KR" altLang="en-US" dirty="0" smtClean="0"/>
+              <a:t>조회</a:t>
+            </a:r>
+            <a:endParaRPr lang="ko-KR" altLang="en-US" dirty="0"/>
+          </a:p>
+        </p:txBody>
+      </p:sp>
+      <p:sp>
+        <p:nvSpPr>
+          <p:cNvPr id="39" name="직사각형 38">
+            <a:extLst>
+              <a:ext uri="{FF2B5EF4-FFF2-40B4-BE49-F238E27FC236}">
+                <a16:creationId xmlns:a16="http://schemas.microsoft.com/office/drawing/2014/main" id="{942434A1-5E54-4F16-8758-BBD4AF046FAD}"/>
               </a:ext>
             </a:extLst>
           </p:cNvPr>
@@ -7415,7 +7418,7 @@
         </p:nvSpPr>
         <p:spPr>
           <a:xfrm>
-            <a:off x="4021164" y="3303825"/>
+            <a:off x="5805947" y="3303825"/>
             <a:ext cx="1375615" cy="413657"/>
           </a:xfrm>
           <a:prstGeom prst="rect">
@@ -7444,18 +7447,19 @@
           <a:p>
             <a:pPr algn="ctr"/>
             <a:r>
-              <a:rPr lang="ko-KR" altLang="en-US"/>
-              <a:t>생성</a:t>
-            </a:r>
-          </a:p>
-        </p:txBody>
-      </p:sp>
-      <p:sp>
-        <p:nvSpPr>
-          <p:cNvPr id="37" name="직사각형 36">
-            <a:extLst>
-              <a:ext uri="{FF2B5EF4-FFF2-40B4-BE49-F238E27FC236}">
-                <a16:creationId xmlns:a16="http://schemas.microsoft.com/office/drawing/2014/main" id="{F7072E44-7E1E-410C-A935-4675D48FEF2E}"/>
+              <a:rPr lang="ko-KR" altLang="en-US" dirty="0" smtClean="0"/>
+              <a:t>조회</a:t>
+            </a:r>
+            <a:endParaRPr lang="ko-KR" altLang="en-US" dirty="0"/>
+          </a:p>
+        </p:txBody>
+      </p:sp>
+      <p:sp>
+        <p:nvSpPr>
+          <p:cNvPr id="42" name="직사각형 41">
+            <a:extLst>
+              <a:ext uri="{FF2B5EF4-FFF2-40B4-BE49-F238E27FC236}">
+                <a16:creationId xmlns:a16="http://schemas.microsoft.com/office/drawing/2014/main" id="{8B54FCFC-6AAF-443A-A1C4-DD276581D2EE}"/>
               </a:ext>
             </a:extLst>
           </p:cNvPr>
@@ -7464,7 +7468,7 @@
         </p:nvSpPr>
         <p:spPr>
           <a:xfrm>
-            <a:off x="4021162" y="4503401"/>
+            <a:off x="5805947" y="3903612"/>
             <a:ext cx="1375615" cy="413657"/>
           </a:xfrm>
           <a:prstGeom prst="rect">
@@ -7494,17 +7498,17 @@
             <a:pPr algn="ctr"/>
             <a:r>
               <a:rPr lang="ko-KR" altLang="en-US"/>
-              <a:t>수정</a:t>
-            </a:r>
-          </a:p>
-        </p:txBody>
-      </p:sp>
-      <p:sp>
-        <p:nvSpPr>
-          <p:cNvPr id="38" name="직사각형 37">
-            <a:extLst>
-              <a:ext uri="{FF2B5EF4-FFF2-40B4-BE49-F238E27FC236}">
-                <a16:creationId xmlns:a16="http://schemas.microsoft.com/office/drawing/2014/main" id="{7290107F-E213-4F71-BD4F-C080D79ED08E}"/>
+              <a:t>삭제</a:t>
+            </a:r>
+          </a:p>
+        </p:txBody>
+      </p:sp>
+      <p:sp>
+        <p:nvSpPr>
+          <p:cNvPr id="43" name="직사각형 42">
+            <a:extLst>
+              <a:ext uri="{FF2B5EF4-FFF2-40B4-BE49-F238E27FC236}">
+                <a16:creationId xmlns:a16="http://schemas.microsoft.com/office/drawing/2014/main" id="{12C19A9C-07D6-4911-8CE3-74EB0E0183D3}"/>
               </a:ext>
             </a:extLst>
           </p:cNvPr>
@@ -7513,7 +7517,7 @@
         </p:nvSpPr>
         <p:spPr>
           <a:xfrm>
-            <a:off x="4021161" y="5103189"/>
+            <a:off x="7492298" y="3316858"/>
             <a:ext cx="1375615" cy="413657"/>
           </a:xfrm>
           <a:prstGeom prst="rect">
@@ -7542,18 +7546,19 @@
           <a:p>
             <a:pPr algn="ctr"/>
             <a:r>
-              <a:rPr lang="ko-KR" altLang="en-US"/>
-              <a:t>삭제</a:t>
-            </a:r>
-          </a:p>
-        </p:txBody>
-      </p:sp>
-      <p:sp>
-        <p:nvSpPr>
-          <p:cNvPr id="39" name="직사각형 38">
-            <a:extLst>
-              <a:ext uri="{FF2B5EF4-FFF2-40B4-BE49-F238E27FC236}">
-                <a16:creationId xmlns:a16="http://schemas.microsoft.com/office/drawing/2014/main" id="{942434A1-5E54-4F16-8758-BBD4AF046FAD}"/>
+              <a:rPr lang="ko-KR" altLang="en-US" dirty="0" smtClean="0"/>
+              <a:t>조회</a:t>
+            </a:r>
+            <a:endParaRPr lang="ko-KR" altLang="en-US" dirty="0"/>
+          </a:p>
+        </p:txBody>
+      </p:sp>
+      <p:sp>
+        <p:nvSpPr>
+          <p:cNvPr id="46" name="직사각형 45">
+            <a:extLst>
+              <a:ext uri="{FF2B5EF4-FFF2-40B4-BE49-F238E27FC236}">
+                <a16:creationId xmlns:a16="http://schemas.microsoft.com/office/drawing/2014/main" id="{D4730C24-E11D-4B86-9E53-6AB9CAFDFE9C}"/>
               </a:ext>
             </a:extLst>
           </p:cNvPr>
@@ -7562,7 +7567,7 @@
         </p:nvSpPr>
         <p:spPr>
           <a:xfrm>
-            <a:off x="5756731" y="3903613"/>
+            <a:off x="7492298" y="3903612"/>
             <a:ext cx="1375615" cy="413657"/>
           </a:xfrm>
           <a:prstGeom prst="rect">
@@ -7592,17 +7597,88 @@
             <a:pPr algn="ctr"/>
             <a:r>
               <a:rPr lang="ko-KR" altLang="en-US"/>
-              <a:t>읽기</a:t>
-            </a:r>
-          </a:p>
-        </p:txBody>
-      </p:sp>
-      <p:sp>
-        <p:nvSpPr>
-          <p:cNvPr id="40" name="직사각형 39">
-            <a:extLst>
-              <a:ext uri="{FF2B5EF4-FFF2-40B4-BE49-F238E27FC236}">
-                <a16:creationId xmlns:a16="http://schemas.microsoft.com/office/drawing/2014/main" id="{6EF82684-8BA3-47DC-AC91-7FCA029F8DC7}"/>
+              <a:t>삭제</a:t>
+            </a:r>
+          </a:p>
+        </p:txBody>
+      </p:sp>
+      <p:sp>
+        <p:nvSpPr>
+          <p:cNvPr id="47" name="TextBox 46">
+            <a:extLst>
+              <a:ext uri="{FF2B5EF4-FFF2-40B4-BE49-F238E27FC236}">
+                <a16:creationId xmlns:a16="http://schemas.microsoft.com/office/drawing/2014/main" id="{CB3FC4CB-1831-4300-A2B3-F1702CB52036}"/>
+              </a:ext>
+            </a:extLst>
+          </p:cNvPr>
+          <p:cNvSpPr txBox="1"/>
+          <p:nvPr/>
+        </p:nvSpPr>
+        <p:spPr>
+          <a:xfrm>
+            <a:off x="235131" y="252549"/>
+            <a:ext cx="3199915" cy="369332"/>
+          </a:xfrm>
+          <a:prstGeom prst="rect">
+            <a:avLst/>
+          </a:prstGeom>
+          <a:noFill/>
+        </p:spPr>
+        <p:txBody>
+          <a:bodyPr wrap="none" rtlCol="0">
+            <a:spAutoFit/>
+          </a:bodyPr>
+          <a:lstStyle/>
+          <a:p>
+            <a:r>
+              <a:rPr lang="ko-KR" altLang="en-US"/>
+              <a:t>관리자 페이지의 구성과 기능</a:t>
+            </a:r>
+          </a:p>
+        </p:txBody>
+      </p:sp>
+      <p:sp>
+        <p:nvSpPr>
+          <p:cNvPr id="2" name="TextBox 1">
+            <a:extLst>
+              <a:ext uri="{FF2B5EF4-FFF2-40B4-BE49-F238E27FC236}">
+                <a16:creationId xmlns:a16="http://schemas.microsoft.com/office/drawing/2014/main" id="{3F2E1565-FCE2-4E51-B4B4-B1763B0FA796}"/>
+              </a:ext>
+            </a:extLst>
+          </p:cNvPr>
+          <p:cNvSpPr txBox="1"/>
+          <p:nvPr/>
+        </p:nvSpPr>
+        <p:spPr>
+          <a:xfrm>
+            <a:off x="5093488" y="1436463"/>
+            <a:ext cx="928459" cy="369332"/>
+          </a:xfrm>
+          <a:prstGeom prst="rect">
+            <a:avLst/>
+          </a:prstGeom>
+          <a:noFill/>
+        </p:spPr>
+        <p:txBody>
+          <a:bodyPr wrap="none" rtlCol="0">
+            <a:spAutoFit/>
+          </a:bodyPr>
+          <a:lstStyle/>
+          <a:p>
+            <a:r>
+              <a:rPr lang="en-US" altLang="ko-KR"/>
+              <a:t>/admin</a:t>
+            </a:r>
+            <a:endParaRPr lang="ko-KR" altLang="en-US"/>
+          </a:p>
+        </p:txBody>
+      </p:sp>
+      <p:sp>
+        <p:nvSpPr>
+          <p:cNvPr id="48" name="직사각형 47">
+            <a:extLst>
+              <a:ext uri="{FF2B5EF4-FFF2-40B4-BE49-F238E27FC236}">
+                <a16:creationId xmlns:a16="http://schemas.microsoft.com/office/drawing/2014/main" id="{A70EDCC7-AD3F-4696-96DD-F73D1CDF10C8}"/>
               </a:ext>
             </a:extLst>
           </p:cNvPr>
@@ -7611,7 +7687,56 @@
         </p:nvSpPr>
         <p:spPr>
           <a:xfrm>
-            <a:off x="5756732" y="3303825"/>
+            <a:off x="9129513" y="2771499"/>
+            <a:ext cx="1375615" cy="413657"/>
+          </a:xfrm>
+          <a:prstGeom prst="rect">
+            <a:avLst/>
+          </a:prstGeom>
+        </p:spPr>
+        <p:style>
+          <a:lnRef idx="2">
+            <a:schemeClr val="accent6">
+              <a:shade val="50000"/>
+            </a:schemeClr>
+          </a:lnRef>
+          <a:fillRef idx="1">
+            <a:schemeClr val="accent6"/>
+          </a:fillRef>
+          <a:effectRef idx="0">
+            <a:schemeClr val="accent6"/>
+          </a:effectRef>
+          <a:fontRef idx="minor">
+            <a:schemeClr val="lt1"/>
+          </a:fontRef>
+        </p:style>
+        <p:txBody>
+          <a:bodyPr rtlCol="0" anchor="ctr"/>
+          <a:lstStyle/>
+          <a:p>
+            <a:pPr algn="ctr"/>
+            <a:r>
+              <a:rPr lang="ko-KR" altLang="en-US"/>
+              <a:t>태그</a:t>
+            </a:r>
+          </a:p>
+        </p:txBody>
+      </p:sp>
+      <p:sp>
+        <p:nvSpPr>
+          <p:cNvPr id="49" name="직사각형 48">
+            <a:extLst>
+              <a:ext uri="{FF2B5EF4-FFF2-40B4-BE49-F238E27FC236}">
+                <a16:creationId xmlns:a16="http://schemas.microsoft.com/office/drawing/2014/main" id="{C2C1C470-A3C1-4554-9CAC-93E6A48F7ACD}"/>
+              </a:ext>
+            </a:extLst>
+          </p:cNvPr>
+          <p:cNvSpPr/>
+          <p:nvPr/>
+        </p:nvSpPr>
+        <p:spPr>
+          <a:xfrm>
+            <a:off x="9129509" y="3345967"/>
             <a:ext cx="1375615" cy="413657"/>
           </a:xfrm>
           <a:prstGeom prst="rect">
@@ -7641,17 +7766,17 @@
             <a:pPr algn="ctr"/>
             <a:r>
               <a:rPr lang="ko-KR" altLang="en-US"/>
-              <a:t>생성</a:t>
-            </a:r>
-          </a:p>
-        </p:txBody>
-      </p:sp>
-      <p:sp>
-        <p:nvSpPr>
-          <p:cNvPr id="41" name="직사각형 40">
-            <a:extLst>
-              <a:ext uri="{FF2B5EF4-FFF2-40B4-BE49-F238E27FC236}">
-                <a16:creationId xmlns:a16="http://schemas.microsoft.com/office/drawing/2014/main" id="{B8BE0761-572B-4605-9BAA-A2D05093DAE9}"/>
+              <a:t>읽기</a:t>
+            </a:r>
+          </a:p>
+        </p:txBody>
+      </p:sp>
+      <p:sp>
+        <p:nvSpPr>
+          <p:cNvPr id="50" name="직사각형 49">
+            <a:extLst>
+              <a:ext uri="{FF2B5EF4-FFF2-40B4-BE49-F238E27FC236}">
+                <a16:creationId xmlns:a16="http://schemas.microsoft.com/office/drawing/2014/main" id="{29C5E10C-9609-4199-9C86-DBA7D321CEE1}"/>
               </a:ext>
             </a:extLst>
           </p:cNvPr>
@@ -7660,7 +7785,7 @@
         </p:nvSpPr>
         <p:spPr>
           <a:xfrm>
-            <a:off x="5756730" y="4503401"/>
+            <a:off x="9129510" y="3941162"/>
             <a:ext cx="1375615" cy="413657"/>
           </a:xfrm>
           <a:prstGeom prst="rect">
@@ -7689,472 +7814,10 @@
           <a:p>
             <a:pPr algn="ctr"/>
             <a:r>
-              <a:rPr lang="ko-KR" altLang="en-US"/>
-              <a:t>수정</a:t>
-            </a:r>
-          </a:p>
-        </p:txBody>
-      </p:sp>
-      <p:sp>
-        <p:nvSpPr>
-          <p:cNvPr id="42" name="직사각형 41">
-            <a:extLst>
-              <a:ext uri="{FF2B5EF4-FFF2-40B4-BE49-F238E27FC236}">
-                <a16:creationId xmlns:a16="http://schemas.microsoft.com/office/drawing/2014/main" id="{8B54FCFC-6AAF-443A-A1C4-DD276581D2EE}"/>
-              </a:ext>
-            </a:extLst>
-          </p:cNvPr>
-          <p:cNvSpPr/>
-          <p:nvPr/>
-        </p:nvSpPr>
-        <p:spPr>
-          <a:xfrm>
-            <a:off x="5756729" y="5103189"/>
-            <a:ext cx="1375615" cy="413657"/>
-          </a:xfrm>
-          <a:prstGeom prst="rect">
-            <a:avLst/>
-          </a:prstGeom>
-        </p:spPr>
-        <p:style>
-          <a:lnRef idx="2">
-            <a:schemeClr val="accent3">
-              <a:shade val="50000"/>
-            </a:schemeClr>
-          </a:lnRef>
-          <a:fillRef idx="1">
-            <a:schemeClr val="accent3"/>
-          </a:fillRef>
-          <a:effectRef idx="0">
-            <a:schemeClr val="accent3"/>
-          </a:effectRef>
-          <a:fontRef idx="minor">
-            <a:schemeClr val="lt1"/>
-          </a:fontRef>
-        </p:style>
-        <p:txBody>
-          <a:bodyPr rtlCol="0" anchor="ctr"/>
-          <a:lstStyle/>
-          <a:p>
-            <a:pPr algn="ctr"/>
-            <a:r>
-              <a:rPr lang="ko-KR" altLang="en-US"/>
-              <a:t>삭제</a:t>
-            </a:r>
-          </a:p>
-        </p:txBody>
-      </p:sp>
-      <p:sp>
-        <p:nvSpPr>
-          <p:cNvPr id="43" name="직사각형 42">
-            <a:extLst>
-              <a:ext uri="{FF2B5EF4-FFF2-40B4-BE49-F238E27FC236}">
-                <a16:creationId xmlns:a16="http://schemas.microsoft.com/office/drawing/2014/main" id="{12C19A9C-07D6-4911-8CE3-74EB0E0183D3}"/>
-              </a:ext>
-            </a:extLst>
-          </p:cNvPr>
-          <p:cNvSpPr/>
-          <p:nvPr/>
-        </p:nvSpPr>
-        <p:spPr>
-          <a:xfrm>
-            <a:off x="7492300" y="3903613"/>
-            <a:ext cx="1375615" cy="413657"/>
-          </a:xfrm>
-          <a:prstGeom prst="rect">
-            <a:avLst/>
-          </a:prstGeom>
-        </p:spPr>
-        <p:style>
-          <a:lnRef idx="2">
-            <a:schemeClr val="accent3">
-              <a:shade val="50000"/>
-            </a:schemeClr>
-          </a:lnRef>
-          <a:fillRef idx="1">
-            <a:schemeClr val="accent3"/>
-          </a:fillRef>
-          <a:effectRef idx="0">
-            <a:schemeClr val="accent3"/>
-          </a:effectRef>
-          <a:fontRef idx="minor">
-            <a:schemeClr val="lt1"/>
-          </a:fontRef>
-        </p:style>
-        <p:txBody>
-          <a:bodyPr rtlCol="0" anchor="ctr"/>
-          <a:lstStyle/>
-          <a:p>
-            <a:pPr algn="ctr"/>
-            <a:r>
-              <a:rPr lang="ko-KR" altLang="en-US"/>
-              <a:t>읽기</a:t>
-            </a:r>
-          </a:p>
-        </p:txBody>
-      </p:sp>
-      <p:sp>
-        <p:nvSpPr>
-          <p:cNvPr id="44" name="직사각형 43">
-            <a:extLst>
-              <a:ext uri="{FF2B5EF4-FFF2-40B4-BE49-F238E27FC236}">
-                <a16:creationId xmlns:a16="http://schemas.microsoft.com/office/drawing/2014/main" id="{0090A54A-00BD-41F8-A2BD-E22BB02761CE}"/>
-              </a:ext>
-            </a:extLst>
-          </p:cNvPr>
-          <p:cNvSpPr/>
-          <p:nvPr/>
-        </p:nvSpPr>
-        <p:spPr>
-          <a:xfrm>
-            <a:off x="7492301" y="3303825"/>
-            <a:ext cx="1375615" cy="413657"/>
-          </a:xfrm>
-          <a:prstGeom prst="rect">
-            <a:avLst/>
-          </a:prstGeom>
-        </p:spPr>
-        <p:style>
-          <a:lnRef idx="2">
-            <a:schemeClr val="accent3">
-              <a:shade val="50000"/>
-            </a:schemeClr>
-          </a:lnRef>
-          <a:fillRef idx="1">
-            <a:schemeClr val="accent3"/>
-          </a:fillRef>
-          <a:effectRef idx="0">
-            <a:schemeClr val="accent3"/>
-          </a:effectRef>
-          <a:fontRef idx="minor">
-            <a:schemeClr val="lt1"/>
-          </a:fontRef>
-        </p:style>
-        <p:txBody>
-          <a:bodyPr rtlCol="0" anchor="ctr"/>
-          <a:lstStyle/>
-          <a:p>
-            <a:pPr algn="ctr"/>
-            <a:r>
-              <a:rPr lang="ko-KR" altLang="en-US"/>
-              <a:t>생성</a:t>
-            </a:r>
-          </a:p>
-        </p:txBody>
-      </p:sp>
-      <p:sp>
-        <p:nvSpPr>
-          <p:cNvPr id="45" name="직사각형 44">
-            <a:extLst>
-              <a:ext uri="{FF2B5EF4-FFF2-40B4-BE49-F238E27FC236}">
-                <a16:creationId xmlns:a16="http://schemas.microsoft.com/office/drawing/2014/main" id="{408BA93A-D4C8-45D6-9AD8-52BEBCE15232}"/>
-              </a:ext>
-            </a:extLst>
-          </p:cNvPr>
-          <p:cNvSpPr/>
-          <p:nvPr/>
-        </p:nvSpPr>
-        <p:spPr>
-          <a:xfrm>
-            <a:off x="7492299" y="4503401"/>
-            <a:ext cx="1375615" cy="413657"/>
-          </a:xfrm>
-          <a:prstGeom prst="rect">
-            <a:avLst/>
-          </a:prstGeom>
-        </p:spPr>
-        <p:style>
-          <a:lnRef idx="2">
-            <a:schemeClr val="accent3">
-              <a:shade val="50000"/>
-            </a:schemeClr>
-          </a:lnRef>
-          <a:fillRef idx="1">
-            <a:schemeClr val="accent3"/>
-          </a:fillRef>
-          <a:effectRef idx="0">
-            <a:schemeClr val="accent3"/>
-          </a:effectRef>
-          <a:fontRef idx="minor">
-            <a:schemeClr val="lt1"/>
-          </a:fontRef>
-        </p:style>
-        <p:txBody>
-          <a:bodyPr rtlCol="0" anchor="ctr"/>
-          <a:lstStyle/>
-          <a:p>
-            <a:pPr algn="ctr"/>
-            <a:r>
-              <a:rPr lang="ko-KR" altLang="en-US"/>
-              <a:t>수정</a:t>
-            </a:r>
-          </a:p>
-        </p:txBody>
-      </p:sp>
-      <p:sp>
-        <p:nvSpPr>
-          <p:cNvPr id="46" name="직사각형 45">
-            <a:extLst>
-              <a:ext uri="{FF2B5EF4-FFF2-40B4-BE49-F238E27FC236}">
-                <a16:creationId xmlns:a16="http://schemas.microsoft.com/office/drawing/2014/main" id="{D4730C24-E11D-4B86-9E53-6AB9CAFDFE9C}"/>
-              </a:ext>
-            </a:extLst>
-          </p:cNvPr>
-          <p:cNvSpPr/>
-          <p:nvPr/>
-        </p:nvSpPr>
-        <p:spPr>
-          <a:xfrm>
-            <a:off x="7492298" y="5103189"/>
-            <a:ext cx="1375615" cy="413657"/>
-          </a:xfrm>
-          <a:prstGeom prst="rect">
-            <a:avLst/>
-          </a:prstGeom>
-        </p:spPr>
-        <p:style>
-          <a:lnRef idx="2">
-            <a:schemeClr val="accent3">
-              <a:shade val="50000"/>
-            </a:schemeClr>
-          </a:lnRef>
-          <a:fillRef idx="1">
-            <a:schemeClr val="accent3"/>
-          </a:fillRef>
-          <a:effectRef idx="0">
-            <a:schemeClr val="accent3"/>
-          </a:effectRef>
-          <a:fontRef idx="minor">
-            <a:schemeClr val="lt1"/>
-          </a:fontRef>
-        </p:style>
-        <p:txBody>
-          <a:bodyPr rtlCol="0" anchor="ctr"/>
-          <a:lstStyle/>
-          <a:p>
-            <a:pPr algn="ctr"/>
-            <a:r>
-              <a:rPr lang="ko-KR" altLang="en-US"/>
-              <a:t>삭제</a:t>
-            </a:r>
-          </a:p>
-        </p:txBody>
-      </p:sp>
-      <p:sp>
-        <p:nvSpPr>
-          <p:cNvPr id="47" name="TextBox 46">
-            <a:extLst>
-              <a:ext uri="{FF2B5EF4-FFF2-40B4-BE49-F238E27FC236}">
-                <a16:creationId xmlns:a16="http://schemas.microsoft.com/office/drawing/2014/main" id="{CB3FC4CB-1831-4300-A2B3-F1702CB52036}"/>
-              </a:ext>
-            </a:extLst>
-          </p:cNvPr>
-          <p:cNvSpPr txBox="1"/>
-          <p:nvPr/>
-        </p:nvSpPr>
-        <p:spPr>
-          <a:xfrm>
-            <a:off x="235131" y="252549"/>
-            <a:ext cx="3199915" cy="369332"/>
-          </a:xfrm>
-          <a:prstGeom prst="rect">
-            <a:avLst/>
-          </a:prstGeom>
-          <a:noFill/>
-        </p:spPr>
-        <p:txBody>
-          <a:bodyPr wrap="none" rtlCol="0">
-            <a:spAutoFit/>
-          </a:bodyPr>
-          <a:lstStyle/>
-          <a:p>
-            <a:r>
-              <a:rPr lang="ko-KR" altLang="en-US"/>
-              <a:t>관리자 페이지의 구성과 기능</a:t>
-            </a:r>
-          </a:p>
-        </p:txBody>
-      </p:sp>
-      <p:sp>
-        <p:nvSpPr>
-          <p:cNvPr id="2" name="TextBox 1">
-            <a:extLst>
-              <a:ext uri="{FF2B5EF4-FFF2-40B4-BE49-F238E27FC236}">
-                <a16:creationId xmlns:a16="http://schemas.microsoft.com/office/drawing/2014/main" id="{3F2E1565-FCE2-4E51-B4B4-B1763B0FA796}"/>
-              </a:ext>
-            </a:extLst>
-          </p:cNvPr>
-          <p:cNvSpPr txBox="1"/>
-          <p:nvPr/>
-        </p:nvSpPr>
-        <p:spPr>
-          <a:xfrm>
-            <a:off x="5093488" y="1436463"/>
-            <a:ext cx="928459" cy="369332"/>
-          </a:xfrm>
-          <a:prstGeom prst="rect">
-            <a:avLst/>
-          </a:prstGeom>
-          <a:noFill/>
-        </p:spPr>
-        <p:txBody>
-          <a:bodyPr wrap="none" rtlCol="0">
-            <a:spAutoFit/>
-          </a:bodyPr>
-          <a:lstStyle/>
-          <a:p>
-            <a:r>
-              <a:rPr lang="en-US" altLang="ko-KR"/>
-              <a:t>/admin</a:t>
-            </a:r>
-            <a:endParaRPr lang="ko-KR" altLang="en-US"/>
-          </a:p>
-        </p:txBody>
-      </p:sp>
-      <p:sp>
-        <p:nvSpPr>
-          <p:cNvPr id="48" name="직사각형 47">
-            <a:extLst>
-              <a:ext uri="{FF2B5EF4-FFF2-40B4-BE49-F238E27FC236}">
-                <a16:creationId xmlns:a16="http://schemas.microsoft.com/office/drawing/2014/main" id="{A70EDCC7-AD3F-4696-96DD-F73D1CDF10C8}"/>
-              </a:ext>
-            </a:extLst>
-          </p:cNvPr>
-          <p:cNvSpPr/>
-          <p:nvPr/>
-        </p:nvSpPr>
-        <p:spPr>
-          <a:xfrm>
-            <a:off x="9129513" y="2771499"/>
-            <a:ext cx="1375615" cy="413657"/>
-          </a:xfrm>
-          <a:prstGeom prst="rect">
-            <a:avLst/>
-          </a:prstGeom>
-        </p:spPr>
-        <p:style>
-          <a:lnRef idx="2">
-            <a:schemeClr val="accent6">
-              <a:shade val="50000"/>
-            </a:schemeClr>
-          </a:lnRef>
-          <a:fillRef idx="1">
-            <a:schemeClr val="accent6"/>
-          </a:fillRef>
-          <a:effectRef idx="0">
-            <a:schemeClr val="accent6"/>
-          </a:effectRef>
-          <a:fontRef idx="minor">
-            <a:schemeClr val="lt1"/>
-          </a:fontRef>
-        </p:style>
-        <p:txBody>
-          <a:bodyPr rtlCol="0" anchor="ctr"/>
-          <a:lstStyle/>
-          <a:p>
-            <a:pPr algn="ctr"/>
-            <a:r>
-              <a:rPr lang="ko-KR" altLang="en-US"/>
-              <a:t>태그</a:t>
-            </a:r>
-          </a:p>
-        </p:txBody>
-      </p:sp>
-      <p:sp>
-        <p:nvSpPr>
-          <p:cNvPr id="49" name="직사각형 48">
-            <a:extLst>
-              <a:ext uri="{FF2B5EF4-FFF2-40B4-BE49-F238E27FC236}">
-                <a16:creationId xmlns:a16="http://schemas.microsoft.com/office/drawing/2014/main" id="{C2C1C470-A3C1-4554-9CAC-93E6A48F7ACD}"/>
-              </a:ext>
-            </a:extLst>
-          </p:cNvPr>
-          <p:cNvSpPr/>
-          <p:nvPr/>
-        </p:nvSpPr>
-        <p:spPr>
-          <a:xfrm>
-            <a:off x="9129512" y="3903613"/>
-            <a:ext cx="1375615" cy="413657"/>
-          </a:xfrm>
-          <a:prstGeom prst="rect">
-            <a:avLst/>
-          </a:prstGeom>
-        </p:spPr>
-        <p:style>
-          <a:lnRef idx="2">
-            <a:schemeClr val="accent3">
-              <a:shade val="50000"/>
-            </a:schemeClr>
-          </a:lnRef>
-          <a:fillRef idx="1">
-            <a:schemeClr val="accent3"/>
-          </a:fillRef>
-          <a:effectRef idx="0">
-            <a:schemeClr val="accent3"/>
-          </a:effectRef>
-          <a:fontRef idx="minor">
-            <a:schemeClr val="lt1"/>
-          </a:fontRef>
-        </p:style>
-        <p:txBody>
-          <a:bodyPr rtlCol="0" anchor="ctr"/>
-          <a:lstStyle/>
-          <a:p>
-            <a:pPr algn="ctr"/>
-            <a:r>
-              <a:rPr lang="ko-KR" altLang="en-US"/>
-              <a:t>읽기</a:t>
-            </a:r>
-          </a:p>
-        </p:txBody>
-      </p:sp>
-      <p:sp>
-        <p:nvSpPr>
-          <p:cNvPr id="50" name="직사각형 49">
-            <a:extLst>
-              <a:ext uri="{FF2B5EF4-FFF2-40B4-BE49-F238E27FC236}">
-                <a16:creationId xmlns:a16="http://schemas.microsoft.com/office/drawing/2014/main" id="{29C5E10C-9609-4199-9C86-DBA7D321CEE1}"/>
-              </a:ext>
-            </a:extLst>
-          </p:cNvPr>
-          <p:cNvSpPr/>
-          <p:nvPr/>
-        </p:nvSpPr>
-        <p:spPr>
-          <a:xfrm>
-            <a:off x="9129513" y="3303825"/>
-            <a:ext cx="1375615" cy="413657"/>
-          </a:xfrm>
-          <a:prstGeom prst="rect">
-            <a:avLst/>
-          </a:prstGeom>
-        </p:spPr>
-        <p:style>
-          <a:lnRef idx="2">
-            <a:schemeClr val="accent3">
-              <a:shade val="50000"/>
-            </a:schemeClr>
-          </a:lnRef>
-          <a:fillRef idx="1">
-            <a:schemeClr val="accent3"/>
-          </a:fillRef>
-          <a:effectRef idx="0">
-            <a:schemeClr val="accent3"/>
-          </a:effectRef>
-          <a:fontRef idx="minor">
-            <a:schemeClr val="lt1"/>
-          </a:fontRef>
-        </p:style>
-        <p:txBody>
-          <a:bodyPr rtlCol="0" anchor="ctr"/>
-          <a:lstStyle/>
-          <a:p>
-            <a:pPr algn="ctr"/>
-            <a:r>
-              <a:rPr lang="ko-KR" altLang="en-US"/>
-              <a:t>생성</a:t>
-            </a:r>
+              <a:rPr lang="ko-KR" altLang="en-US" dirty="0" smtClean="0"/>
+              <a:t>등록</a:t>
+            </a:r>
+            <a:endParaRPr lang="ko-KR" altLang="en-US" dirty="0"/>
           </a:p>
         </p:txBody>
       </p:sp>
@@ -8424,9 +8087,14 @@
           <a:p>
             <a:pPr algn="ctr"/>
             <a:r>
-              <a:rPr lang="ko-KR" altLang="en-US"/>
-              <a:t>구독 정보</a:t>
-            </a:r>
+              <a:rPr lang="ko-KR" altLang="en-US" dirty="0"/>
+              <a:t>구독 </a:t>
+            </a:r>
+            <a:r>
+              <a:rPr lang="ko-KR" altLang="en-US" dirty="0" smtClean="0"/>
+              <a:t>관리</a:t>
+            </a:r>
+            <a:endParaRPr lang="ko-KR" altLang="en-US" dirty="0"/>
           </a:p>
         </p:txBody>
       </p:sp>
@@ -8473,9 +8141,10 @@
           <a:p>
             <a:pPr algn="ctr"/>
             <a:r>
-              <a:rPr lang="ko-KR" altLang="en-US"/>
-              <a:t>구독 상품 평가</a:t>
-            </a:r>
+              <a:rPr lang="ko-KR" altLang="en-US" dirty="0" smtClean="0"/>
+              <a:t>주문 관리</a:t>
+            </a:r>
+            <a:endParaRPr lang="ko-KR" altLang="en-US" dirty="0"/>
           </a:p>
         </p:txBody>
       </p:sp>
@@ -8522,9 +8191,14 @@
           <a:p>
             <a:pPr algn="ctr"/>
             <a:r>
-              <a:rPr lang="ko-KR" altLang="en-US"/>
-              <a:t>회원 정보 관리</a:t>
-            </a:r>
+              <a:rPr lang="ko-KR" altLang="en-US" dirty="0"/>
+              <a:t>회원 정보 </a:t>
+            </a:r>
+            <a:r>
+              <a:rPr lang="ko-KR" altLang="en-US" dirty="0" smtClean="0"/>
+              <a:t>수정</a:t>
+            </a:r>
+            <a:endParaRPr lang="ko-KR" altLang="en-US" dirty="0"/>
           </a:p>
         </p:txBody>
       </p:sp>
@@ -8637,8 +8311,8 @@
         </p:nvSpPr>
         <p:spPr>
           <a:xfrm>
-            <a:off x="2226381" y="4077799"/>
-            <a:ext cx="1197871" cy="413657"/>
+            <a:off x="2176965" y="4028732"/>
+            <a:ext cx="1296695" cy="743583"/>
           </a:xfrm>
           <a:prstGeom prst="rect">
             <a:avLst/>
@@ -8666,9 +8340,18 @@
           <a:p>
             <a:pPr algn="ctr"/>
             <a:r>
-              <a:rPr lang="ko-KR" altLang="en-US"/>
-              <a:t>구독 내역</a:t>
-            </a:r>
+              <a:rPr lang="ko-KR" altLang="en-US" dirty="0" smtClean="0"/>
+              <a:t>구독 상품</a:t>
+            </a:r>
+            <a:endParaRPr lang="en-US" altLang="ko-KR" dirty="0" smtClean="0"/>
+          </a:p>
+          <a:p>
+            <a:pPr algn="ctr"/>
+            <a:r>
+              <a:rPr lang="ko-KR" altLang="en-US" dirty="0" smtClean="0"/>
+              <a:t> 내역 보기 </a:t>
+            </a:r>
+            <a:endParaRPr lang="ko-KR" altLang="en-US" dirty="0"/>
           </a:p>
         </p:txBody>
       </p:sp>
@@ -8686,7 +8369,7 @@
         </p:nvSpPr>
         <p:spPr>
           <a:xfrm>
-            <a:off x="2226381" y="4698285"/>
+            <a:off x="2226379" y="4960107"/>
             <a:ext cx="1197871" cy="413657"/>
           </a:xfrm>
           <a:prstGeom prst="rect">
@@ -8715,9 +8398,14 @@
           <a:p>
             <a:pPr algn="ctr"/>
             <a:r>
-              <a:rPr lang="ko-KR" altLang="en-US"/>
-              <a:t>구독 상품</a:t>
-            </a:r>
+              <a:rPr lang="ko-KR" altLang="en-US" dirty="0"/>
+              <a:t>구독 </a:t>
+            </a:r>
+            <a:r>
+              <a:rPr lang="ko-KR" altLang="en-US" dirty="0" smtClean="0"/>
+              <a:t>정보</a:t>
+            </a:r>
+            <a:endParaRPr lang="ko-KR" altLang="en-US" dirty="0"/>
           </a:p>
         </p:txBody>
       </p:sp>
@@ -8735,7 +8423,7 @@
         </p:nvSpPr>
         <p:spPr>
           <a:xfrm>
-            <a:off x="2226381" y="5276327"/>
+            <a:off x="2226379" y="5561556"/>
             <a:ext cx="1197871" cy="413657"/>
           </a:xfrm>
           <a:prstGeom prst="rect">
@@ -8830,8 +8518,8 @@
         </p:nvSpPr>
         <p:spPr>
           <a:xfrm>
-            <a:off x="3925131" y="3494322"/>
-            <a:ext cx="1725806" cy="790305"/>
+            <a:off x="4066560" y="3513917"/>
+            <a:ext cx="1291031" cy="416605"/>
           </a:xfrm>
           <a:prstGeom prst="rect">
             <a:avLst/>
@@ -8859,9 +8547,10 @@
           <a:p>
             <a:pPr algn="ctr"/>
             <a:r>
-              <a:rPr lang="ko-KR" altLang="en-US"/>
-              <a:t>과거 구독 상품 구성 보기</a:t>
-            </a:r>
+              <a:rPr lang="ko-KR" altLang="en-US" dirty="0" smtClean="0"/>
+              <a:t>주문 내역</a:t>
+            </a:r>
+            <a:endParaRPr lang="ko-KR" altLang="en-US" dirty="0"/>
           </a:p>
         </p:txBody>
       </p:sp>
@@ -8928,8 +8617,8 @@
         </p:nvSpPr>
         <p:spPr>
           <a:xfrm>
-            <a:off x="3925131" y="4484933"/>
-            <a:ext cx="1725806" cy="1205051"/>
+            <a:off x="4066559" y="4085105"/>
+            <a:ext cx="1291031" cy="475174"/>
           </a:xfrm>
           <a:prstGeom prst="rect">
             <a:avLst/>
@@ -8957,10 +8646,10 @@
           <a:p>
             <a:pPr algn="ctr"/>
             <a:r>
-              <a:rPr lang="ko-KR" altLang="en-US"/>
-              <a:t>배송 받은 상품에 대한 호불호 표시</a:t>
-            </a:r>
-            <a:endParaRPr lang="en-US" altLang="ko-KR"/>
+              <a:rPr lang="ko-KR" altLang="en-US" dirty="0" smtClean="0"/>
+              <a:t>주문 취소</a:t>
+            </a:r>
+            <a:endParaRPr lang="en-US" altLang="ko-KR" dirty="0"/>
           </a:p>
         </p:txBody>
       </p:sp>
@@ -9476,7 +9165,7 @@
         <p:spPr>
           <a:xfrm>
             <a:off x="600891" y="1140823"/>
-            <a:ext cx="4610558" cy="3416320"/>
+            <a:ext cx="4610558" cy="3139321"/>
           </a:xfrm>
           <a:prstGeom prst="rect">
             <a:avLst/>
@@ -9493,45 +9182,45 @@
               <a:buAutoNum type="arabicPeriod"/>
             </a:pPr>
             <a:r>
-              <a:rPr lang="ko-KR" altLang="en-US"/>
+              <a:rPr lang="ko-KR" altLang="en-US" dirty="0" err="1"/>
               <a:t>메인페이지</a:t>
             </a:r>
-            <a:endParaRPr lang="en-US" altLang="ko-KR"/>
+            <a:endParaRPr lang="en-US" altLang="ko-KR" dirty="0"/>
           </a:p>
           <a:p>
             <a:pPr marL="342900" indent="-342900">
               <a:buAutoNum type="arabicPeriod"/>
             </a:pPr>
             <a:r>
-              <a:rPr lang="ko-KR" altLang="en-US"/>
+              <a:rPr lang="ko-KR" altLang="en-US" dirty="0"/>
               <a:t>회원가입</a:t>
             </a:r>
             <a:r>
-              <a:rPr lang="en-US" altLang="ko-KR"/>
+              <a:rPr lang="en-US" altLang="ko-KR" dirty="0"/>
               <a:t>/</a:t>
             </a:r>
             <a:r>
-              <a:rPr lang="ko-KR" altLang="en-US"/>
+              <a:rPr lang="ko-KR" altLang="en-US" dirty="0"/>
               <a:t>로그인 </a:t>
             </a:r>
             <a:r>
-              <a:rPr lang="en-US" altLang="ko-KR"/>
+              <a:rPr lang="en-US" altLang="ko-KR" dirty="0"/>
               <a:t>(</a:t>
             </a:r>
             <a:r>
-              <a:rPr lang="ko-KR" altLang="en-US"/>
+              <a:rPr lang="ko-KR" altLang="en-US" dirty="0"/>
               <a:t>아이디</a:t>
             </a:r>
             <a:r>
-              <a:rPr lang="en-US" altLang="ko-KR"/>
+              <a:rPr lang="en-US" altLang="ko-KR" dirty="0"/>
               <a:t>, </a:t>
             </a:r>
             <a:r>
-              <a:rPr lang="ko-KR" altLang="en-US"/>
+              <a:rPr lang="ko-KR" altLang="en-US" dirty="0"/>
               <a:t>비번</a:t>
             </a:r>
             <a:r>
-              <a:rPr lang="en-US" altLang="ko-KR"/>
+              <a:rPr lang="en-US" altLang="ko-KR" dirty="0"/>
               <a:t>)</a:t>
             </a:r>
           </a:p>
@@ -9540,11 +9229,11 @@
               <a:buAutoNum type="arabicPeriod"/>
             </a:pPr>
             <a:r>
-              <a:rPr lang="ko-KR" altLang="en-US"/>
+              <a:rPr lang="ko-KR" altLang="en-US" dirty="0"/>
               <a:t>관리자 페이지</a:t>
             </a:r>
             <a:r>
-              <a:rPr lang="en-US" altLang="ko-KR"/>
+              <a:rPr lang="en-US" altLang="ko-KR" dirty="0"/>
               <a:t>(CRUD)</a:t>
             </a:r>
           </a:p>
@@ -9553,27 +9242,27 @@
               <a:buAutoNum type="arabicPeriod"/>
             </a:pPr>
             <a:r>
-              <a:rPr lang="ko-KR" altLang="en-US"/>
+              <a:rPr lang="ko-KR" altLang="en-US" dirty="0"/>
               <a:t>구독 페이지</a:t>
             </a:r>
             <a:r>
-              <a:rPr lang="en-US" altLang="ko-KR"/>
+              <a:rPr lang="en-US" altLang="ko-KR" dirty="0"/>
               <a:t>(</a:t>
             </a:r>
             <a:r>
-              <a:rPr lang="ko-KR" altLang="en-US"/>
+              <a:rPr lang="ko-KR" altLang="en-US" dirty="0"/>
               <a:t>구독 상세</a:t>
             </a:r>
             <a:r>
-              <a:rPr lang="en-US" altLang="ko-KR"/>
+              <a:rPr lang="en-US" altLang="ko-KR" dirty="0"/>
               <a:t>, </a:t>
             </a:r>
             <a:r>
-              <a:rPr lang="ko-KR" altLang="en-US"/>
+              <a:rPr lang="ko-KR" altLang="en-US" dirty="0"/>
               <a:t>설명</a:t>
             </a:r>
             <a:r>
-              <a:rPr lang="en-US" altLang="ko-KR"/>
+              <a:rPr lang="en-US" altLang="ko-KR" dirty="0"/>
               <a:t>)</a:t>
             </a:r>
           </a:p>
@@ -9582,19 +9271,19 @@
               <a:buAutoNum type="arabicPeriod"/>
             </a:pPr>
             <a:r>
-              <a:rPr lang="ko-KR" altLang="en-US"/>
+              <a:rPr lang="ko-KR" altLang="en-US" dirty="0"/>
               <a:t>장바구니</a:t>
             </a:r>
             <a:r>
-              <a:rPr lang="en-US" altLang="ko-KR"/>
+              <a:rPr lang="en-US" altLang="ko-KR" dirty="0"/>
               <a:t>(</a:t>
             </a:r>
             <a:r>
-              <a:rPr lang="ko-KR" altLang="en-US"/>
+              <a:rPr lang="ko-KR" altLang="en-US" dirty="0"/>
               <a:t>선택한 제품의 리스트 페이지</a:t>
             </a:r>
             <a:r>
-              <a:rPr lang="en-US" altLang="ko-KR"/>
+              <a:rPr lang="en-US" altLang="ko-KR" dirty="0"/>
               <a:t>)</a:t>
             </a:r>
           </a:p>
@@ -9603,59 +9292,63 @@
               <a:buAutoNum type="arabicPeriod"/>
             </a:pPr>
             <a:r>
-              <a:rPr lang="ko-KR" altLang="en-US"/>
+              <a:rPr lang="ko-KR" altLang="en-US" dirty="0"/>
               <a:t>결제 페이지</a:t>
             </a:r>
-            <a:endParaRPr lang="en-US" altLang="ko-KR"/>
+            <a:endParaRPr lang="en-US" altLang="ko-KR" dirty="0"/>
           </a:p>
           <a:p>
             <a:pPr marL="342900" indent="-342900">
               <a:buAutoNum type="arabicPeriod"/>
             </a:pPr>
             <a:r>
-              <a:rPr lang="ko-KR" altLang="en-US"/>
+              <a:rPr lang="ko-KR" altLang="en-US" dirty="0"/>
               <a:t>결제 확인 페이지</a:t>
             </a:r>
-            <a:endParaRPr lang="en-US" altLang="ko-KR"/>
+            <a:endParaRPr lang="en-US" altLang="ko-KR" dirty="0"/>
           </a:p>
           <a:p>
             <a:pPr marL="342900" indent="-342900">
               <a:buAutoNum type="arabicPeriod"/>
             </a:pPr>
             <a:r>
-              <a:rPr lang="ko-KR" altLang="en-US"/>
+              <a:rPr lang="ko-KR" altLang="en-US" dirty="0" err="1"/>
               <a:t>마이페이지</a:t>
             </a:r>
-            <a:endParaRPr lang="en-US" altLang="ko-KR"/>
+            <a:endParaRPr lang="en-US" altLang="ko-KR" dirty="0"/>
           </a:p>
           <a:p>
             <a:pPr marL="342900" indent="-342900">
               <a:buAutoNum type="arabicPeriod"/>
             </a:pPr>
             <a:r>
-              <a:rPr lang="ko-KR" altLang="en-US"/>
+              <a:rPr lang="ko-KR" altLang="en-US" dirty="0"/>
               <a:t>쇼핑</a:t>
             </a:r>
-            <a:endParaRPr lang="en-US" altLang="ko-KR"/>
+            <a:endParaRPr lang="en-US" altLang="ko-KR" dirty="0"/>
           </a:p>
           <a:p>
             <a:pPr marL="342900" indent="-342900">
               <a:buAutoNum type="arabicPeriod"/>
             </a:pPr>
             <a:r>
-              <a:rPr lang="ko-KR" altLang="en-US"/>
+              <a:rPr lang="ko-KR" altLang="en-US" dirty="0"/>
               <a:t> 리뷰</a:t>
             </a:r>
             <a:r>
-              <a:rPr lang="en-US" altLang="ko-KR"/>
+              <a:rPr lang="en-US" altLang="ko-KR" dirty="0"/>
               <a:t>(</a:t>
             </a:r>
             <a:r>
-              <a:rPr lang="ko-KR" altLang="en-US"/>
-              <a:t>랜덤박스를 리뷰</a:t>
-            </a:r>
-            <a:r>
-              <a:rPr lang="en-US" altLang="ko-KR"/>
+              <a:rPr lang="ko-KR" altLang="en-US" dirty="0" err="1"/>
+              <a:t>랜덤박스를</a:t>
+            </a:r>
+            <a:r>
+              <a:rPr lang="ko-KR" altLang="en-US" dirty="0"/>
+              <a:t> 리뷰</a:t>
+            </a:r>
+            <a:r>
+              <a:rPr lang="en-US" altLang="ko-KR" dirty="0"/>
               <a:t>)</a:t>
             </a:r>
           </a:p>
@@ -9664,28 +9357,22 @@
               <a:buAutoNum type="arabicPeriod"/>
             </a:pPr>
             <a:r>
-              <a:rPr lang="ko-KR" altLang="en-US"/>
+              <a:rPr lang="ko-KR" altLang="en-US" dirty="0"/>
               <a:t>아이디</a:t>
             </a:r>
             <a:r>
-              <a:rPr lang="en-US" altLang="ko-KR"/>
+              <a:rPr lang="en-US" altLang="ko-KR" dirty="0"/>
               <a:t>, </a:t>
             </a:r>
             <a:r>
-              <a:rPr lang="ko-KR" altLang="en-US"/>
-              <a:t>비번 찾기</a:t>
-            </a:r>
-            <a:endParaRPr lang="en-US" altLang="ko-KR"/>
-          </a:p>
-          <a:p>
-            <a:pPr marL="342900" indent="-342900">
-              <a:buAutoNum type="arabicPeriod"/>
-            </a:pPr>
-            <a:r>
-              <a:rPr lang="ko-KR" altLang="en-US"/>
-              <a:t>고객센터</a:t>
-            </a:r>
-            <a:endParaRPr lang="en-US" altLang="ko-KR"/>
+              <a:rPr lang="ko-KR" altLang="en-US" dirty="0"/>
+              <a:t>비번 </a:t>
+            </a:r>
+            <a:r>
+              <a:rPr lang="ko-KR" altLang="en-US" dirty="0" smtClean="0"/>
+              <a:t>찾기</a:t>
+            </a:r>
+            <a:endParaRPr lang="en-US" altLang="ko-KR" dirty="0"/>
           </a:p>
         </p:txBody>
       </p:sp>
@@ -9734,7 +9421,7 @@
         <p:spPr>
           <a:xfrm>
             <a:off x="478970" y="1299316"/>
-            <a:ext cx="7628709" cy="4893647"/>
+            <a:ext cx="7628709" cy="5262979"/>
           </a:xfrm>
           <a:prstGeom prst="rect">
             <a:avLst/>
@@ -9748,213 +9435,486 @@
           <a:lstStyle/>
           <a:p>
             <a:r>
-              <a:rPr lang="ko-KR" altLang="en-US" sz="1200"/>
+              <a:rPr lang="ko-KR" altLang="en-US" sz="1200" dirty="0" err="1"/>
               <a:t>RootController</a:t>
             </a:r>
-          </a:p>
-          <a:p>
-            <a:r>
-              <a:rPr lang="ko-KR" altLang="en-US" sz="1200"/>
-              <a:t>/admin			관리자 페이지, SPA</a:t>
-            </a:r>
-          </a:p>
-          <a:p>
-            <a:r>
-              <a:rPr lang="ko-KR" altLang="en-US" sz="1200"/>
-              <a:t>/signup			회윈가입 페이지</a:t>
-            </a:r>
-          </a:p>
-          <a:p>
-            <a:r>
-              <a:rPr lang="ko-KR" altLang="en-US" sz="1200"/>
-              <a:t>/login			로그인 페이지</a:t>
-            </a:r>
-          </a:p>
-          <a:p>
-            <a:r>
-              <a:rPr lang="ko-KR" altLang="en-US" sz="1200"/>
-              <a:t>/cs			고객센터</a:t>
-            </a:r>
-          </a:p>
-          <a:p>
-            <a:endParaRPr lang="ko-KR" altLang="en-US" sz="1200"/>
-          </a:p>
-          <a:p>
-            <a:r>
-              <a:rPr lang="ko-KR" altLang="en-US" sz="1200"/>
+            <a:endParaRPr lang="ko-KR" altLang="en-US" sz="1200" dirty="0"/>
+          </a:p>
+          <a:p>
+            <a:r>
+              <a:rPr lang="ko-KR" altLang="en-US" sz="1200" dirty="0"/>
+              <a:t>/</a:t>
+            </a:r>
+            <a:r>
+              <a:rPr lang="ko-KR" altLang="en-US" sz="1200" dirty="0" err="1"/>
+              <a:t>admin</a:t>
+            </a:r>
+            <a:r>
+              <a:rPr lang="ko-KR" altLang="en-US" sz="1200" dirty="0"/>
+              <a:t>			관리자 페이지, SPA</a:t>
+            </a:r>
+          </a:p>
+          <a:p>
+            <a:r>
+              <a:rPr lang="ko-KR" altLang="en-US" sz="1200" dirty="0"/>
+              <a:t>/</a:t>
+            </a:r>
+            <a:r>
+              <a:rPr lang="ko-KR" altLang="en-US" sz="1200" dirty="0" err="1"/>
+              <a:t>signup</a:t>
+            </a:r>
+            <a:r>
+              <a:rPr lang="ko-KR" altLang="en-US" sz="1200" dirty="0"/>
+              <a:t>			</a:t>
+            </a:r>
+            <a:r>
+              <a:rPr lang="ko-KR" altLang="en-US" sz="1200" dirty="0" err="1"/>
+              <a:t>회윈가입</a:t>
+            </a:r>
+            <a:r>
+              <a:rPr lang="ko-KR" altLang="en-US" sz="1200" dirty="0"/>
+              <a:t> 페이지</a:t>
+            </a:r>
+          </a:p>
+          <a:p>
+            <a:r>
+              <a:rPr lang="ko-KR" altLang="en-US" sz="1200" dirty="0"/>
+              <a:t>/</a:t>
+            </a:r>
+            <a:r>
+              <a:rPr lang="ko-KR" altLang="en-US" sz="1200" dirty="0" err="1"/>
+              <a:t>login</a:t>
+            </a:r>
+            <a:r>
+              <a:rPr lang="ko-KR" altLang="en-US" sz="1200" dirty="0"/>
+              <a:t>			로그인 페이지</a:t>
+            </a:r>
+          </a:p>
+          <a:p>
+            <a:endParaRPr lang="ko-KR" altLang="en-US" sz="1200" dirty="0"/>
+          </a:p>
+          <a:p>
+            <a:r>
+              <a:rPr lang="ko-KR" altLang="en-US" sz="1200" dirty="0" err="1"/>
               <a:t>SubscribeController</a:t>
             </a:r>
-          </a:p>
-          <a:p>
-            <a:r>
-              <a:rPr lang="ko-KR" altLang="en-US" sz="1200"/>
-              <a:t>/sub/detail		</a:t>
-            </a:r>
-            <a:r>
-              <a:rPr lang="en-US" altLang="ko-KR" sz="1200"/>
+            <a:endParaRPr lang="ko-KR" altLang="en-US" sz="1200" dirty="0"/>
+          </a:p>
+          <a:p>
+            <a:r>
+              <a:rPr lang="ko-KR" altLang="en-US" sz="1200" dirty="0"/>
+              <a:t>/</a:t>
+            </a:r>
+            <a:r>
+              <a:rPr lang="ko-KR" altLang="en-US" sz="1200" dirty="0" err="1"/>
+              <a:t>sub</a:t>
+            </a:r>
+            <a:r>
+              <a:rPr lang="ko-KR" altLang="en-US" sz="1200" dirty="0"/>
+              <a:t>/</a:t>
+            </a:r>
+            <a:r>
+              <a:rPr lang="ko-KR" altLang="en-US" sz="1200" dirty="0" err="1"/>
+              <a:t>detail</a:t>
+            </a:r>
+            <a:r>
+              <a:rPr lang="ko-KR" altLang="en-US" sz="1200" dirty="0"/>
+              <a:t>		</a:t>
+            </a:r>
+            <a:r>
+              <a:rPr lang="en-US" altLang="ko-KR" sz="1200" dirty="0"/>
               <a:t>	</a:t>
             </a:r>
             <a:r>
-              <a:rPr lang="ko-KR" altLang="en-US" sz="1200"/>
+              <a:rPr lang="ko-KR" altLang="en-US" sz="1200" dirty="0"/>
               <a:t>구독의 자세한 설명 페이지</a:t>
             </a:r>
             <a:r>
-              <a:rPr lang="en-US" altLang="ko-KR" sz="1200"/>
+              <a:rPr lang="en-US" altLang="ko-KR" sz="1200" dirty="0"/>
               <a:t>(</a:t>
             </a:r>
             <a:r>
-              <a:rPr lang="ko-KR" altLang="en-US" sz="1200"/>
+              <a:rPr lang="ko-KR" altLang="en-US" sz="1200" dirty="0"/>
               <a:t>가격 선택</a:t>
             </a:r>
             <a:r>
-              <a:rPr lang="en-US" altLang="ko-KR" sz="1200"/>
+              <a:rPr lang="en-US" altLang="ko-KR" sz="1200" dirty="0"/>
               <a:t>)</a:t>
             </a:r>
-            <a:endParaRPr lang="ko-KR" altLang="en-US" sz="1200"/>
-          </a:p>
-          <a:p>
-            <a:r>
-              <a:rPr lang="ko-KR" altLang="en-US" sz="1200"/>
-              <a:t>/sub/tag			구독 시 선호하는 태그 선택 페이지</a:t>
+            <a:endParaRPr lang="ko-KR" altLang="en-US" sz="1200" dirty="0"/>
+          </a:p>
+          <a:p>
+            <a:r>
+              <a:rPr lang="ko-KR" altLang="en-US" sz="1200" dirty="0"/>
+              <a:t>/</a:t>
+            </a:r>
+            <a:r>
+              <a:rPr lang="ko-KR" altLang="en-US" sz="1200" dirty="0" err="1"/>
+              <a:t>sub</a:t>
+            </a:r>
+            <a:r>
+              <a:rPr lang="ko-KR" altLang="en-US" sz="1200" dirty="0"/>
+              <a:t>/</a:t>
+            </a:r>
+            <a:r>
+              <a:rPr lang="ko-KR" altLang="en-US" sz="1200" dirty="0" err="1"/>
+              <a:t>tag</a:t>
+            </a:r>
+            <a:r>
+              <a:rPr lang="ko-KR" altLang="en-US" sz="1200" dirty="0"/>
+              <a:t>			구독 시 선호하는 태그 선택 페이지</a:t>
+            </a:r>
+            <a:endParaRPr lang="en-US" altLang="ko-KR" sz="1200" dirty="0"/>
+          </a:p>
+          <a:p>
+            <a:r>
+              <a:rPr lang="en-US" altLang="ko-KR" sz="1200" dirty="0"/>
+              <a:t>/sub/payment		</a:t>
+            </a:r>
+            <a:r>
+              <a:rPr lang="ko-KR" altLang="en-US" sz="1200" dirty="0"/>
+              <a:t>구독을 결재하는 페이지</a:t>
+            </a:r>
+          </a:p>
+          <a:p>
+            <a:endParaRPr lang="ko-KR" altLang="en-US" sz="1200" dirty="0"/>
+          </a:p>
+          <a:p>
+            <a:r>
+              <a:rPr lang="ko-KR" altLang="en-US" sz="1200" dirty="0" err="1"/>
+              <a:t>OrdersController</a:t>
+            </a:r>
+            <a:endParaRPr lang="ko-KR" altLang="en-US" sz="1200" dirty="0"/>
+          </a:p>
+          <a:p>
+            <a:r>
+              <a:rPr lang="ko-KR" altLang="en-US" sz="1200" dirty="0"/>
+              <a:t>/</a:t>
+            </a:r>
+            <a:r>
+              <a:rPr lang="ko-KR" altLang="en-US" sz="1200" dirty="0" err="1"/>
+              <a:t>orders</a:t>
+            </a:r>
+            <a:r>
+              <a:rPr lang="ko-KR" altLang="en-US" sz="1200" dirty="0"/>
+              <a:t>/</a:t>
+            </a:r>
+            <a:r>
+              <a:rPr lang="ko-KR" altLang="en-US" sz="1200" dirty="0" err="1"/>
+              <a:t>payment</a:t>
+            </a:r>
+            <a:r>
+              <a:rPr lang="ko-KR" altLang="en-US" sz="1200" dirty="0"/>
+              <a:t>		결제 양식 페이지</a:t>
+            </a:r>
+          </a:p>
+          <a:p>
+            <a:r>
+              <a:rPr lang="ko-KR" altLang="en-US" sz="1200" dirty="0"/>
+              <a:t>/</a:t>
+            </a:r>
+            <a:r>
+              <a:rPr lang="ko-KR" altLang="en-US" sz="1200" dirty="0" err="1"/>
+              <a:t>orders</a:t>
+            </a:r>
+            <a:r>
+              <a:rPr lang="ko-KR" altLang="en-US" sz="1200" dirty="0"/>
+              <a:t>/</a:t>
+            </a:r>
+            <a:r>
+              <a:rPr lang="ko-KR" altLang="en-US" sz="1200" dirty="0" err="1"/>
+              <a:t>cart</a:t>
+            </a:r>
+            <a:r>
+              <a:rPr lang="ko-KR" altLang="en-US" sz="1200" dirty="0"/>
+              <a:t>		</a:t>
+            </a:r>
+            <a:r>
+              <a:rPr lang="en-US" altLang="ko-KR" sz="1200" dirty="0"/>
+              <a:t>	</a:t>
+            </a:r>
+            <a:r>
+              <a:rPr lang="ko-KR" altLang="en-US" sz="1200" dirty="0"/>
+              <a:t>장바구니 페이지</a:t>
+            </a:r>
+          </a:p>
+          <a:p>
+            <a:r>
+              <a:rPr lang="ko-KR" altLang="en-US" sz="1200" dirty="0"/>
+              <a:t>/</a:t>
+            </a:r>
+            <a:r>
+              <a:rPr lang="ko-KR" altLang="en-US" sz="1200" dirty="0" err="1"/>
+              <a:t>orders</a:t>
+            </a:r>
+            <a:r>
+              <a:rPr lang="ko-KR" altLang="en-US" sz="1200" dirty="0"/>
+              <a:t>/</a:t>
+            </a:r>
+            <a:r>
+              <a:rPr lang="ko-KR" altLang="en-US" sz="1200" dirty="0" err="1"/>
+              <a:t>confirm</a:t>
+            </a:r>
+            <a:r>
+              <a:rPr lang="ko-KR" altLang="en-US" sz="1200" dirty="0"/>
+              <a:t>		결제 확인(결제 양식을 작성해서 결제한 상품 보여주는) 페이지</a:t>
+            </a:r>
+          </a:p>
+          <a:p>
+            <a:endParaRPr lang="ko-KR" altLang="en-US" sz="1200" dirty="0"/>
+          </a:p>
+          <a:p>
+            <a:r>
+              <a:rPr lang="ko-KR" altLang="en-US" sz="1200" dirty="0" err="1"/>
+              <a:t>ReviewController</a:t>
+            </a:r>
+            <a:endParaRPr lang="ko-KR" altLang="en-US" sz="1200" dirty="0"/>
+          </a:p>
+          <a:p>
+            <a:r>
+              <a:rPr lang="ko-KR" altLang="en-US" sz="1200" dirty="0"/>
+              <a:t>/</a:t>
+            </a:r>
+            <a:r>
+              <a:rPr lang="ko-KR" altLang="en-US" sz="1200" dirty="0" err="1"/>
+              <a:t>review</a:t>
+            </a:r>
+            <a:r>
+              <a:rPr lang="ko-KR" altLang="en-US" sz="1200" dirty="0"/>
+              <a:t>/</a:t>
+            </a:r>
+            <a:r>
+              <a:rPr lang="ko-KR" altLang="en-US" sz="1200" dirty="0" err="1"/>
+              <a:t>list</a:t>
+            </a:r>
+            <a:r>
+              <a:rPr lang="ko-KR" altLang="en-US" sz="1200" dirty="0"/>
+              <a:t>		</a:t>
+            </a:r>
+            <a:r>
+              <a:rPr lang="en-US" altLang="ko-KR" sz="1200" dirty="0"/>
+              <a:t>	</a:t>
+            </a:r>
+            <a:r>
+              <a:rPr lang="ko-KR" altLang="en-US" sz="1200" dirty="0"/>
+              <a:t>리뷰 리스트</a:t>
+            </a:r>
+          </a:p>
+          <a:p>
+            <a:r>
+              <a:rPr lang="ko-KR" altLang="en-US" sz="1200" dirty="0"/>
+              <a:t>/</a:t>
+            </a:r>
+            <a:r>
+              <a:rPr lang="ko-KR" altLang="en-US" sz="1200" dirty="0" err="1"/>
+              <a:t>review</a:t>
+            </a:r>
+            <a:r>
+              <a:rPr lang="ko-KR" altLang="en-US" sz="1200" dirty="0"/>
+              <a:t>/</a:t>
+            </a:r>
+            <a:r>
+              <a:rPr lang="ko-KR" altLang="en-US" sz="1200" dirty="0" err="1"/>
+              <a:t>add</a:t>
+            </a:r>
+            <a:r>
+              <a:rPr lang="ko-KR" altLang="en-US" sz="1200" dirty="0"/>
+              <a:t>		</a:t>
+            </a:r>
+            <a:r>
+              <a:rPr lang="en-US" altLang="ko-KR" sz="1200" dirty="0"/>
+              <a:t>	</a:t>
+            </a:r>
+            <a:r>
+              <a:rPr lang="ko-KR" altLang="en-US" sz="1200" dirty="0"/>
+              <a:t>리뷰 작성</a:t>
+            </a:r>
+          </a:p>
+          <a:p>
+            <a:r>
+              <a:rPr lang="ko-KR" altLang="en-US" sz="1200" dirty="0"/>
+              <a:t>/</a:t>
+            </a:r>
+            <a:r>
+              <a:rPr lang="ko-KR" altLang="en-US" sz="1200" dirty="0" err="1"/>
+              <a:t>review</a:t>
+            </a:r>
+            <a:r>
+              <a:rPr lang="ko-KR" altLang="en-US" sz="1200" dirty="0"/>
+              <a:t>/{</a:t>
+            </a:r>
+            <a:r>
+              <a:rPr lang="ko-KR" altLang="en-US" sz="1200" dirty="0" err="1"/>
+              <a:t>code</a:t>
+            </a:r>
+            <a:r>
+              <a:rPr lang="ko-KR" altLang="en-US" sz="1200" dirty="0"/>
+              <a:t>}		리뷰 상세, 리뷰 </a:t>
+            </a:r>
+            <a:r>
+              <a:rPr lang="ko-KR" altLang="en-US" sz="1200" dirty="0" err="1"/>
+              <a:t>한개</a:t>
+            </a:r>
+            <a:r>
+              <a:rPr lang="ko-KR" altLang="en-US" sz="1200" dirty="0"/>
+              <a:t> 보기</a:t>
+            </a:r>
+          </a:p>
+          <a:p>
+            <a:r>
+              <a:rPr lang="ko-KR" altLang="en-US" sz="1200" dirty="0"/>
+              <a:t>/</a:t>
+            </a:r>
+            <a:r>
+              <a:rPr lang="ko-KR" altLang="en-US" sz="1200" dirty="0" err="1"/>
+              <a:t>review</a:t>
+            </a:r>
+            <a:r>
+              <a:rPr lang="ko-KR" altLang="en-US" sz="1200" dirty="0"/>
+              <a:t>/</a:t>
+            </a:r>
+            <a:r>
+              <a:rPr lang="ko-KR" altLang="en-US" sz="1200" dirty="0" err="1"/>
+              <a:t>update</a:t>
+            </a:r>
+            <a:r>
+              <a:rPr lang="ko-KR" altLang="en-US" sz="1200" dirty="0"/>
+              <a:t>/{</a:t>
+            </a:r>
+            <a:r>
+              <a:rPr lang="ko-KR" altLang="en-US" sz="1200" dirty="0" err="1"/>
+              <a:t>code</a:t>
+            </a:r>
+            <a:r>
+              <a:rPr lang="ko-KR" altLang="en-US" sz="1200" dirty="0"/>
+              <a:t>}	</a:t>
+            </a:r>
+            <a:r>
+              <a:rPr lang="en-US" altLang="ko-KR" sz="1200" dirty="0"/>
+              <a:t>	</a:t>
+            </a:r>
+            <a:r>
+              <a:rPr lang="ko-KR" altLang="en-US" sz="1200" dirty="0"/>
+              <a:t>리뷰 수정</a:t>
+            </a:r>
+          </a:p>
+          <a:p>
+            <a:r>
+              <a:rPr lang="ko-KR" altLang="en-US" sz="1200" dirty="0"/>
+              <a:t>/</a:t>
+            </a:r>
+            <a:r>
+              <a:rPr lang="ko-KR" altLang="en-US" sz="1200" dirty="0" err="1"/>
+              <a:t>review</a:t>
+            </a:r>
+            <a:r>
+              <a:rPr lang="ko-KR" altLang="en-US" sz="1200" dirty="0"/>
+              <a:t>/</a:t>
+            </a:r>
+            <a:r>
+              <a:rPr lang="ko-KR" altLang="en-US" sz="1200" dirty="0" err="1"/>
+              <a:t>delete</a:t>
+            </a:r>
+            <a:r>
+              <a:rPr lang="ko-KR" altLang="en-US" sz="1200" dirty="0"/>
+              <a:t>/{</a:t>
+            </a:r>
+            <a:r>
+              <a:rPr lang="ko-KR" altLang="en-US" sz="1200" dirty="0" err="1"/>
+              <a:t>code</a:t>
+            </a:r>
+            <a:r>
+              <a:rPr lang="ko-KR" altLang="en-US" sz="1200" dirty="0"/>
+              <a:t>}	</a:t>
+            </a:r>
+            <a:r>
+              <a:rPr lang="en-US" altLang="ko-KR" sz="1200" dirty="0"/>
+              <a:t>	</a:t>
+            </a:r>
+            <a:r>
+              <a:rPr lang="ko-KR" altLang="en-US" sz="1200" dirty="0"/>
+              <a:t>리뷰 삭제</a:t>
+            </a:r>
+          </a:p>
+          <a:p>
+            <a:endParaRPr lang="ko-KR" altLang="en-US" sz="1200" dirty="0"/>
+          </a:p>
+          <a:p>
+            <a:r>
+              <a:rPr lang="ko-KR" altLang="en-US" sz="1200" dirty="0" err="1"/>
+              <a:t>ShoppingController</a:t>
+            </a:r>
+            <a:endParaRPr lang="ko-KR" altLang="en-US" sz="1200" dirty="0"/>
+          </a:p>
+          <a:p>
+            <a:r>
+              <a:rPr lang="ko-KR" altLang="en-US" sz="1200" dirty="0"/>
+              <a:t>/</a:t>
+            </a:r>
+            <a:r>
+              <a:rPr lang="ko-KR" altLang="en-US" sz="1200" dirty="0" err="1"/>
+              <a:t>shopping</a:t>
+            </a:r>
+            <a:r>
+              <a:rPr lang="ko-KR" altLang="en-US" sz="1200" dirty="0"/>
+              <a:t>/</a:t>
+            </a:r>
+            <a:r>
+              <a:rPr lang="ko-KR" altLang="en-US" sz="1200" dirty="0" err="1"/>
+              <a:t>list</a:t>
+            </a:r>
+            <a:r>
+              <a:rPr lang="ko-KR" altLang="en-US" sz="1200" dirty="0"/>
+              <a:t>		쇼핑 리스트(상품 리스트)</a:t>
+            </a:r>
+          </a:p>
+          <a:p>
+            <a:r>
+              <a:rPr lang="ko-KR" altLang="en-US" sz="1200" dirty="0"/>
+              <a:t>/</a:t>
+            </a:r>
+            <a:r>
+              <a:rPr lang="ko-KR" altLang="en-US" sz="1200" dirty="0" err="1"/>
+              <a:t>shopping</a:t>
+            </a:r>
+            <a:r>
+              <a:rPr lang="ko-KR" altLang="en-US" sz="1200" dirty="0"/>
+              <a:t>/{</a:t>
+            </a:r>
+            <a:r>
+              <a:rPr lang="ko-KR" altLang="en-US" sz="1200" dirty="0" err="1"/>
+              <a:t>code</a:t>
+            </a:r>
+            <a:r>
+              <a:rPr lang="ko-KR" altLang="en-US" sz="1200" dirty="0"/>
+              <a:t>}		쇼핑 상세 (상품 1개 자세히</a:t>
+            </a:r>
+            <a:r>
+              <a:rPr lang="ko-KR" altLang="en-US" sz="1200" dirty="0" smtClean="0"/>
+              <a:t>)</a:t>
+            </a:r>
+            <a:endParaRPr lang="en-US" altLang="ko-KR" sz="1200" dirty="0" smtClean="0"/>
+          </a:p>
+          <a:p>
+            <a:endParaRPr lang="en-US" altLang="ko-KR" sz="1200" dirty="0"/>
+          </a:p>
+          <a:p>
+            <a:r>
+              <a:rPr lang="en-US" altLang="ko-KR" sz="1200" dirty="0" err="1" smtClean="0"/>
+              <a:t>MemberController</a:t>
+            </a:r>
+            <a:endParaRPr lang="en-US" altLang="ko-KR" sz="1200" dirty="0" smtClean="0"/>
+          </a:p>
+          <a:p>
+            <a:r>
+              <a:rPr lang="en-US" altLang="ko-KR" sz="1200" smtClean="0"/>
+              <a:t>/member/{id}		</a:t>
+            </a:r>
+            <a:r>
+              <a:rPr lang="ko-KR" altLang="en-US" sz="1200" smtClean="0"/>
+              <a:t>마이페이지</a:t>
             </a:r>
             <a:endParaRPr lang="en-US" altLang="ko-KR" sz="1200"/>
-          </a:p>
-          <a:p>
-            <a:r>
-              <a:rPr lang="en-US" altLang="ko-KR" sz="1200"/>
-              <a:t>/sub/payment		</a:t>
-            </a:r>
-            <a:r>
-              <a:rPr lang="ko-KR" altLang="en-US" sz="1200"/>
-              <a:t>구독을 결재하는 페이지</a:t>
-            </a:r>
-          </a:p>
-          <a:p>
-            <a:endParaRPr lang="ko-KR" altLang="en-US" sz="1200"/>
-          </a:p>
-          <a:p>
-            <a:r>
-              <a:rPr lang="ko-KR" altLang="en-US" sz="1200"/>
-              <a:t>OrdersController</a:t>
-            </a:r>
-          </a:p>
-          <a:p>
-            <a:r>
-              <a:rPr lang="ko-KR" altLang="en-US" sz="1200"/>
-              <a:t>/orders/payment		결제 양식 페이지</a:t>
-            </a:r>
-          </a:p>
-          <a:p>
-            <a:r>
-              <a:rPr lang="ko-KR" altLang="en-US" sz="1200"/>
-              <a:t>/orders/cart		</a:t>
-            </a:r>
-            <a:r>
-              <a:rPr lang="en-US" altLang="ko-KR" sz="1200"/>
-              <a:t>	</a:t>
-            </a:r>
-            <a:r>
-              <a:rPr lang="ko-KR" altLang="en-US" sz="1200"/>
-              <a:t>장바구니 페이지</a:t>
-            </a:r>
-          </a:p>
-          <a:p>
-            <a:r>
-              <a:rPr lang="ko-KR" altLang="en-US" sz="1200"/>
-              <a:t>/orders/confirm		결제 확인(결제 양식을 작성해서 결제한 상품 보여주는) 페이지</a:t>
-            </a:r>
-          </a:p>
-          <a:p>
-            <a:endParaRPr lang="ko-KR" altLang="en-US" sz="1200"/>
-          </a:p>
-          <a:p>
-            <a:r>
-              <a:rPr lang="ko-KR" altLang="en-US" sz="1200"/>
-              <a:t>ReviewController</a:t>
-            </a:r>
-          </a:p>
-          <a:p>
-            <a:r>
-              <a:rPr lang="ko-KR" altLang="en-US" sz="1200"/>
-              <a:t>/review/list		</a:t>
-            </a:r>
-            <a:r>
-              <a:rPr lang="en-US" altLang="ko-KR" sz="1200"/>
-              <a:t>	</a:t>
-            </a:r>
-            <a:r>
-              <a:rPr lang="ko-KR" altLang="en-US" sz="1200"/>
-              <a:t>리뷰 리스트</a:t>
-            </a:r>
-          </a:p>
-          <a:p>
-            <a:r>
-              <a:rPr lang="ko-KR" altLang="en-US" sz="1200"/>
-              <a:t>/review/add		</a:t>
-            </a:r>
-            <a:r>
-              <a:rPr lang="en-US" altLang="ko-KR" sz="1200"/>
-              <a:t>	</a:t>
-            </a:r>
-            <a:r>
-              <a:rPr lang="ko-KR" altLang="en-US" sz="1200"/>
-              <a:t>리뷰 작성</a:t>
-            </a:r>
-          </a:p>
-          <a:p>
-            <a:r>
-              <a:rPr lang="ko-KR" altLang="en-US" sz="1200"/>
-              <a:t>/review/{code}		리뷰 상세, 리뷰 한개 보기</a:t>
-            </a:r>
-          </a:p>
-          <a:p>
-            <a:r>
-              <a:rPr lang="ko-KR" altLang="en-US" sz="1200"/>
-              <a:t>/review/update/{code}	</a:t>
-            </a:r>
-            <a:r>
-              <a:rPr lang="en-US" altLang="ko-KR" sz="1200"/>
-              <a:t>	</a:t>
-            </a:r>
-            <a:r>
-              <a:rPr lang="ko-KR" altLang="en-US" sz="1200"/>
-              <a:t>리뷰 수정</a:t>
-            </a:r>
-          </a:p>
-          <a:p>
-            <a:r>
-              <a:rPr lang="ko-KR" altLang="en-US" sz="1200"/>
-              <a:t>/review/delete/{code}	</a:t>
-            </a:r>
-            <a:r>
-              <a:rPr lang="en-US" altLang="ko-KR" sz="1200"/>
-              <a:t>	</a:t>
-            </a:r>
-            <a:r>
-              <a:rPr lang="ko-KR" altLang="en-US" sz="1200"/>
-              <a:t>리뷰 삭제</a:t>
-            </a:r>
-          </a:p>
-          <a:p>
-            <a:endParaRPr lang="ko-KR" altLang="en-US" sz="1200"/>
-          </a:p>
-          <a:p>
-            <a:r>
-              <a:rPr lang="ko-KR" altLang="en-US" sz="1200"/>
-              <a:t>ShoppingController</a:t>
-            </a:r>
-          </a:p>
-          <a:p>
-            <a:r>
-              <a:rPr lang="ko-KR" altLang="en-US" sz="1200"/>
-              <a:t>/shopping/list		쇼핑 리스트(상품 리스트)</a:t>
-            </a:r>
-          </a:p>
-          <a:p>
-            <a:r>
-              <a:rPr lang="ko-KR" altLang="en-US" sz="1200"/>
-              <a:t>/shopping/{code}		쇼핑 상세 (상품 1개 자세히)</a:t>
-            </a:r>
           </a:p>
         </p:txBody>
       </p:sp>

</xml_diff>